<commit_message>
Arreglo bugs fechas modificar factura
</commit_message>
<xml_diff>
--- a/presentacion_proyecto.pptx
+++ b/presentacion_proyecto.pptx
@@ -291,7 +291,7 @@
           <a:p>
             <a:fld id="{51226D13-DEC9-4EF1-980D-87B8724CC932}" type="slidenum">
               <a:rPr lang="es-ES" smtClean="0"/>
-              <a:t>‹Nº›</a:t>
+              <a:t>‹#›</a:t>
             </a:fld>
             <a:endParaRPr lang="es-ES"/>
           </a:p>
@@ -461,7 +461,7 @@
           <a:p>
             <a:fld id="{51226D13-DEC9-4EF1-980D-87B8724CC932}" type="slidenum">
               <a:rPr lang="es-ES" smtClean="0"/>
-              <a:t>‹Nº›</a:t>
+              <a:t>‹#›</a:t>
             </a:fld>
             <a:endParaRPr lang="es-ES"/>
           </a:p>
@@ -641,7 +641,7 @@
           <a:p>
             <a:fld id="{51226D13-DEC9-4EF1-980D-87B8724CC932}" type="slidenum">
               <a:rPr lang="es-ES" smtClean="0"/>
-              <a:t>‹Nº›</a:t>
+              <a:t>‹#›</a:t>
             </a:fld>
             <a:endParaRPr lang="es-ES"/>
           </a:p>
@@ -811,7 +811,7 @@
           <a:p>
             <a:fld id="{51226D13-DEC9-4EF1-980D-87B8724CC932}" type="slidenum">
               <a:rPr lang="es-ES" smtClean="0"/>
-              <a:t>‹Nº›</a:t>
+              <a:t>‹#›</a:t>
             </a:fld>
             <a:endParaRPr lang="es-ES"/>
           </a:p>
@@ -1057,7 +1057,7 @@
           <a:p>
             <a:fld id="{51226D13-DEC9-4EF1-980D-87B8724CC932}" type="slidenum">
               <a:rPr lang="es-ES" smtClean="0"/>
-              <a:t>‹Nº›</a:t>
+              <a:t>‹#›</a:t>
             </a:fld>
             <a:endParaRPr lang="es-ES"/>
           </a:p>
@@ -1289,7 +1289,7 @@
           <a:p>
             <a:fld id="{51226D13-DEC9-4EF1-980D-87B8724CC932}" type="slidenum">
               <a:rPr lang="es-ES" smtClean="0"/>
-              <a:t>‹Nº›</a:t>
+              <a:t>‹#›</a:t>
             </a:fld>
             <a:endParaRPr lang="es-ES"/>
           </a:p>
@@ -1656,7 +1656,7 @@
           <a:p>
             <a:fld id="{51226D13-DEC9-4EF1-980D-87B8724CC932}" type="slidenum">
               <a:rPr lang="es-ES" smtClean="0"/>
-              <a:t>‹Nº›</a:t>
+              <a:t>‹#›</a:t>
             </a:fld>
             <a:endParaRPr lang="es-ES"/>
           </a:p>
@@ -1774,7 +1774,7 @@
           <a:p>
             <a:fld id="{51226D13-DEC9-4EF1-980D-87B8724CC932}" type="slidenum">
               <a:rPr lang="es-ES" smtClean="0"/>
-              <a:t>‹Nº›</a:t>
+              <a:t>‹#›</a:t>
             </a:fld>
             <a:endParaRPr lang="es-ES"/>
           </a:p>
@@ -1869,7 +1869,7 @@
           <a:p>
             <a:fld id="{51226D13-DEC9-4EF1-980D-87B8724CC932}" type="slidenum">
               <a:rPr lang="es-ES" smtClean="0"/>
-              <a:t>‹Nº›</a:t>
+              <a:t>‹#›</a:t>
             </a:fld>
             <a:endParaRPr lang="es-ES"/>
           </a:p>
@@ -2146,7 +2146,7 @@
           <a:p>
             <a:fld id="{51226D13-DEC9-4EF1-980D-87B8724CC932}" type="slidenum">
               <a:rPr lang="es-ES" smtClean="0"/>
-              <a:t>‹Nº›</a:t>
+              <a:t>‹#›</a:t>
             </a:fld>
             <a:endParaRPr lang="es-ES"/>
           </a:p>
@@ -2403,7 +2403,7 @@
           <a:p>
             <a:fld id="{51226D13-DEC9-4EF1-980D-87B8724CC932}" type="slidenum">
               <a:rPr lang="es-ES" smtClean="0"/>
-              <a:t>‹Nº›</a:t>
+              <a:t>‹#›</a:t>
             </a:fld>
             <a:endParaRPr lang="es-ES"/>
           </a:p>
@@ -2652,7 +2652,7 @@
           <a:p>
             <a:fld id="{51226D13-DEC9-4EF1-980D-87B8724CC932}" type="slidenum">
               <a:rPr lang="es-ES" smtClean="0"/>
-              <a:t>‹Nº›</a:t>
+              <a:t>‹#›</a:t>
             </a:fld>
             <a:endParaRPr lang="es-ES"/>
           </a:p>
@@ -3140,7 +3140,29 @@
                 <a:latin typeface="Calibri" panose="020F0502020204030204" pitchFamily="34" charset="0"/>
                 <a:cs typeface="Calibri" panose="020F0502020204030204" pitchFamily="34" charset="0"/>
               </a:rPr>
-              <a:t>Algorítmica y programación con Python</a:t>
+              <a:t>Algorítmica y </a:t>
+            </a:r>
+            <a:r>
+              <a:rPr lang="es-ES" sz="3200" b="1" i="0" dirty="0" smtClean="0">
+                <a:solidFill>
+                  <a:schemeClr val="bg2"/>
+                </a:solidFill>
+                <a:effectLst/>
+                <a:latin typeface="Calibri" panose="020F0502020204030204" pitchFamily="34" charset="0"/>
+                <a:cs typeface="Calibri" panose="020F0502020204030204" pitchFamily="34" charset="0"/>
+              </a:rPr>
+              <a:t>Programación </a:t>
+            </a:r>
+            <a:r>
+              <a:rPr lang="es-ES" sz="3200" b="1" i="0" dirty="0">
+                <a:solidFill>
+                  <a:schemeClr val="bg2"/>
+                </a:solidFill>
+                <a:effectLst/>
+                <a:latin typeface="Calibri" panose="020F0502020204030204" pitchFamily="34" charset="0"/>
+                <a:cs typeface="Calibri" panose="020F0502020204030204" pitchFamily="34" charset="0"/>
+              </a:rPr>
+              <a:t>con Python</a:t>
             </a:r>
             <a:endParaRPr lang="es-ES" sz="4000" b="1" dirty="0">
               <a:solidFill>
@@ -3183,7 +3205,7 @@
         </p:blipFill>
         <p:spPr>
           <a:xfrm>
-            <a:off x="2202872" y="1546275"/>
+            <a:off x="2202872" y="1575868"/>
             <a:ext cx="4738255" cy="3316779"/>
           </a:xfrm>
           <a:prstGeom prst="rect">
@@ -3402,6 +3424,13 @@
   <p:clrMapOvr>
     <a:masterClrMapping/>
   </p:clrMapOvr>
+  <p:timing>
+    <p:tnLst>
+      <p:par>
+        <p:cTn id="1" dur="indefinite" restart="never" nodeType="tmRoot"/>
+      </p:par>
+    </p:tnLst>
+  </p:timing>
 </p:sld>
 </file>
 
@@ -3824,6 +3853,13 @@
   <p:clrMapOvr>
     <a:masterClrMapping/>
   </p:clrMapOvr>
+  <p:timing>
+    <p:tnLst>
+      <p:par>
+        <p:cTn id="1" dur="indefinite" restart="never" nodeType="tmRoot"/>
+      </p:par>
+    </p:tnLst>
+  </p:timing>
 </p:sld>
 </file>
 
@@ -3909,13 +3945,13 @@
         </p:spPr>
         <p:txBody>
           <a:bodyPr>
-            <a:normAutofit/>
+            <a:noAutofit/>
           </a:bodyPr>
           <a:lstStyle/>
           <a:p>
             <a:pPr algn="just"/>
             <a:r>
-              <a:rPr lang="es-ES" sz="3600" b="1" u="sng" dirty="0">
+              <a:rPr lang="es-ES" sz="2500" b="1" u="sng" dirty="0">
                 <a:latin typeface="Calibri" panose="020F0502020204030204" pitchFamily="34" charset="0"/>
                 <a:cs typeface="Calibri" panose="020F0502020204030204" pitchFamily="34" charset="0"/>
               </a:rPr>
@@ -3928,7 +3964,7 @@
               <a:buAutoNum type="arabicPeriod"/>
             </a:pPr>
             <a:r>
-              <a:rPr lang="es-ES" b="1" dirty="0">
+              <a:rPr lang="es-ES" sz="2500" b="1" dirty="0">
                 <a:solidFill>
                   <a:srgbClr val="FF0000"/>
                 </a:solidFill>
@@ -3936,7 +3972,7 @@
               <a:t>PIL / </a:t>
             </a:r>
             <a:r>
-              <a:rPr lang="es-ES" b="1" dirty="0" err="1">
+              <a:rPr lang="es-ES" sz="2500" b="1" dirty="0" err="1">
                 <a:solidFill>
                   <a:srgbClr val="FF0000"/>
                 </a:solidFill>
@@ -3944,7 +3980,7 @@
               <a:t>Pillow</a:t>
             </a:r>
             <a:r>
-              <a:rPr lang="es-ES" b="1" dirty="0">
+              <a:rPr lang="es-ES" sz="2500" b="1" dirty="0">
                 <a:solidFill>
                   <a:srgbClr val="FF0000"/>
                 </a:solidFill>
@@ -3952,7 +3988,7 @@
               <a:t> </a:t>
             </a:r>
             <a:r>
-              <a:rPr lang="es-ES" dirty="0"/>
+              <a:rPr lang="es-ES" sz="2500" dirty="0"/>
               <a:t>-&gt;  Ajustar imágenes y ventanas</a:t>
             </a:r>
           </a:p>
@@ -3962,7 +3998,7 @@
               <a:buAutoNum type="arabicPeriod"/>
             </a:pPr>
             <a:r>
-              <a:rPr lang="es-ES" b="1" dirty="0" err="1">
+              <a:rPr lang="es-ES" sz="2500" b="1" dirty="0" err="1">
                 <a:solidFill>
                   <a:srgbClr val="FF0000"/>
                 </a:solidFill>
@@ -3970,7 +4006,7 @@
               <a:t>datetime</a:t>
             </a:r>
             <a:r>
-              <a:rPr lang="es-ES" dirty="0"/>
+              <a:rPr lang="es-ES" sz="2500" dirty="0"/>
               <a:t> -&gt; Gestión de fechas</a:t>
             </a:r>
           </a:p>
@@ -3980,7 +4016,7 @@
               <a:buAutoNum type="arabicPeriod"/>
             </a:pPr>
             <a:r>
-              <a:rPr lang="es-ES" b="1" dirty="0" err="1">
+              <a:rPr lang="es-ES" sz="2500" b="1" dirty="0" err="1">
                 <a:solidFill>
                   <a:srgbClr val="FF0000"/>
                 </a:solidFill>
@@ -3988,7 +4024,7 @@
               <a:t>fpdf</a:t>
             </a:r>
             <a:r>
-              <a:rPr lang="es-ES" b="1" dirty="0">
+              <a:rPr lang="es-ES" sz="2500" b="1" dirty="0">
                 <a:solidFill>
                   <a:srgbClr val="FF0000"/>
                 </a:solidFill>
@@ -3996,7 +4032,7 @@
               <a:t> </a:t>
             </a:r>
             <a:r>
-              <a:rPr lang="es-ES" dirty="0"/>
+              <a:rPr lang="es-ES" sz="2500" dirty="0"/>
               <a:t>-&gt; Generador de archivo PDF</a:t>
             </a:r>
           </a:p>
@@ -4006,7 +4042,7 @@
               <a:buAutoNum type="arabicPeriod"/>
             </a:pPr>
             <a:r>
-              <a:rPr lang="es-ES" b="1" dirty="0" err="1">
+              <a:rPr lang="es-ES" sz="2500" b="1" dirty="0" err="1">
                 <a:solidFill>
                   <a:srgbClr val="FF0000"/>
                 </a:solidFill>
@@ -4014,7 +4050,7 @@
               <a:t>Tkinter</a:t>
             </a:r>
             <a:r>
-              <a:rPr lang="es-ES" b="1" dirty="0">
+              <a:rPr lang="es-ES" sz="2500" b="1" dirty="0">
                 <a:solidFill>
                   <a:srgbClr val="FF0000"/>
                 </a:solidFill>
@@ -4022,7 +4058,7 @@
               <a:t> </a:t>
             </a:r>
             <a:r>
-              <a:rPr lang="es-ES" dirty="0"/>
+              <a:rPr lang="es-ES" sz="2500" dirty="0"/>
               <a:t> -&gt; Interfaz gráfica</a:t>
             </a:r>
           </a:p>
@@ -4032,7 +4068,7 @@
               <a:buAutoNum type="arabicPeriod"/>
             </a:pPr>
             <a:r>
-              <a:rPr lang="es-ES" b="1" dirty="0" err="1">
+              <a:rPr lang="es-ES" sz="2500" b="1" dirty="0" err="1">
                 <a:solidFill>
                   <a:srgbClr val="FF0000"/>
                 </a:solidFill>
@@ -4040,7 +4076,7 @@
               <a:t>pathlib</a:t>
             </a:r>
             <a:r>
-              <a:rPr lang="es-ES" b="1" dirty="0">
+              <a:rPr lang="es-ES" sz="2500" b="1" dirty="0">
                 <a:solidFill>
                   <a:srgbClr val="FF0000"/>
                 </a:solidFill>
@@ -4048,7 +4084,7 @@
               <a:t> </a:t>
             </a:r>
             <a:r>
-              <a:rPr lang="es-ES" dirty="0"/>
+              <a:rPr lang="es-ES" sz="2500" dirty="0"/>
               <a:t>-&gt; Manipulación de rutas</a:t>
             </a:r>
           </a:p>
@@ -4058,7 +4094,7 @@
               <a:buAutoNum type="arabicPeriod"/>
             </a:pPr>
             <a:r>
-              <a:rPr lang="es-ES" b="1" dirty="0">
+              <a:rPr lang="es-ES" sz="2500" b="1" dirty="0">
                 <a:solidFill>
                   <a:srgbClr val="FF0000"/>
                 </a:solidFill>
@@ -4066,7 +4102,7 @@
               <a:t>os </a:t>
             </a:r>
             <a:r>
-              <a:rPr lang="es-ES" dirty="0"/>
+              <a:rPr lang="es-ES" sz="2500" dirty="0"/>
               <a:t>-&gt; Obtener rutas del SO y abrir documentos</a:t>
             </a:r>
           </a:p>
@@ -4076,7 +4112,7 @@
               <a:buAutoNum type="arabicPeriod"/>
             </a:pPr>
             <a:r>
-              <a:rPr lang="es-ES" b="1" dirty="0" err="1">
+              <a:rPr lang="es-ES" sz="2500" b="1" dirty="0" err="1">
                 <a:solidFill>
                   <a:srgbClr val="FF0000"/>
                 </a:solidFill>
@@ -4084,7 +4120,7 @@
               <a:t>json</a:t>
             </a:r>
             <a:r>
-              <a:rPr lang="es-ES" dirty="0"/>
+              <a:rPr lang="es-ES" sz="2500" dirty="0"/>
               <a:t> -&gt; Manipulación de archivos JSON</a:t>
             </a:r>
           </a:p>
@@ -4094,7 +4130,7 @@
               <a:buAutoNum type="arabicPeriod"/>
             </a:pPr>
             <a:r>
-              <a:rPr lang="es-ES" b="1" dirty="0" err="1">
+              <a:rPr lang="es-ES" sz="2500" b="1" dirty="0" err="1">
                 <a:solidFill>
                   <a:srgbClr val="FF0000"/>
                 </a:solidFill>
@@ -4102,7 +4138,7 @@
               <a:t>Matplotlib</a:t>
             </a:r>
             <a:r>
-              <a:rPr lang="es-ES" dirty="0"/>
+              <a:rPr lang="es-ES" sz="2500" dirty="0"/>
               <a:t> -&gt; Generador de gráfico</a:t>
             </a:r>
           </a:p>
@@ -4112,7 +4148,7 @@
               <a:buAutoNum type="arabicPeriod"/>
             </a:pPr>
             <a:r>
-              <a:rPr lang="es-ES" b="1" dirty="0" err="1">
+              <a:rPr lang="es-ES" sz="2500" b="1" dirty="0" err="1">
                 <a:solidFill>
                   <a:srgbClr val="FF0000"/>
                 </a:solidFill>
@@ -4120,7 +4156,7 @@
               <a:t>webbrowser</a:t>
             </a:r>
             <a:r>
-              <a:rPr lang="es-ES" b="1" dirty="0">
+              <a:rPr lang="es-ES" sz="2500" b="1" dirty="0">
                 <a:solidFill>
                   <a:srgbClr val="FF0000"/>
                 </a:solidFill>
@@ -4128,14 +4164,14 @@
               <a:t> </a:t>
             </a:r>
             <a:r>
-              <a:rPr lang="es-ES" dirty="0"/>
+              <a:rPr lang="es-ES" sz="2500" dirty="0"/>
               <a:t>-&gt; Incorporar links/</a:t>
             </a:r>
             <a:r>
-              <a:rPr lang="es-ES" dirty="0" err="1"/>
+              <a:rPr lang="es-ES" sz="2500" dirty="0" err="1"/>
               <a:t>url</a:t>
             </a:r>
-            <a:endParaRPr lang="es-ES" dirty="0">
+            <a:endParaRPr lang="es-ES" sz="2500" dirty="0">
               <a:latin typeface="Calibri" panose="020F0502020204030204" pitchFamily="34" charset="0"/>
               <a:cs typeface="Calibri" panose="020F0502020204030204" pitchFamily="34" charset="0"/>
             </a:endParaRPr>
@@ -4196,6 +4232,13 @@
   <p:clrMapOvr>
     <a:masterClrMapping/>
   </p:clrMapOvr>
+  <p:timing>
+    <p:tnLst>
+      <p:par>
+        <p:cTn id="1" dur="indefinite" restart="never" nodeType="tmRoot"/>
+      </p:par>
+    </p:tnLst>
+  </p:timing>
 </p:sld>
 </file>
 
@@ -4853,6 +4896,13 @@
   <p:clrMapOvr>
     <a:masterClrMapping/>
   </p:clrMapOvr>
+  <p:timing>
+    <p:tnLst>
+      <p:par>
+        <p:cTn id="1" dur="indefinite" restart="never" nodeType="tmRoot"/>
+      </p:par>
+    </p:tnLst>
+  </p:timing>
 </p:sld>
 </file>
 
@@ -5172,6 +5222,13 @@
   <p:clrMapOvr>
     <a:masterClrMapping/>
   </p:clrMapOvr>
+  <p:timing>
+    <p:tnLst>
+      <p:par>
+        <p:cTn id="1" dur="indefinite" restart="never" nodeType="tmRoot"/>
+      </p:par>
+    </p:tnLst>
+  </p:timing>
 </p:sld>
 </file>
 
@@ -5855,6 +5912,13 @@
   <p:clrMapOvr>
     <a:masterClrMapping/>
   </p:clrMapOvr>
+  <p:timing>
+    <p:tnLst>
+      <p:par>
+        <p:cTn id="1" dur="indefinite" restart="never" nodeType="tmRoot"/>
+      </p:par>
+    </p:tnLst>
+  </p:timing>
 </p:sld>
 </file>
 
@@ -6193,6 +6257,13 @@
   <p:clrMapOvr>
     <a:masterClrMapping/>
   </p:clrMapOvr>
+  <p:timing>
+    <p:tnLst>
+      <p:par>
+        <p:cTn id="1" dur="indefinite" restart="never" nodeType="tmRoot"/>
+      </p:par>
+    </p:tnLst>
+  </p:timing>
 </p:sld>
 </file>
 

</xml_diff>